<commit_message>
Move over populations slides verbatim
</commit_message>
<xml_diff>
--- a/img/10_part_intro_epi/01_intro_epi/intro_to_epi.pptx
+++ b/img/10_part_intro_epi/01_intro_epi/intro_to_epi.pptx
@@ -8,10 +8,10 @@
     <p:notesMasterId r:id="rId9"/>
   </p:notesMasterIdLst>
   <p:sldIdLst>
-    <p:sldId id="598" r:id="rId5"/>
-    <p:sldId id="554" r:id="rId6"/>
-    <p:sldId id="557" r:id="rId7"/>
-    <p:sldId id="508" r:id="rId8"/>
+    <p:sldId id="554" r:id="rId5"/>
+    <p:sldId id="557" r:id="rId6"/>
+    <p:sldId id="508" r:id="rId7"/>
+    <p:sldId id="471" r:id="rId8"/>
   </p:sldIdLst>
   <p:sldSz cx="12192000" cy="6858000"/>
   <p:notesSz cx="6858000" cy="9144000"/>
@@ -23769,7 +23769,7 @@
           <a:p>
             <a:fld id="{E91DE993-E6A3-E849-86E1-AFF47A1BBBDD}" type="datetimeFigureOut">
               <a:rPr lang="en-US" smtClean="0"/>
-              <a:t>9/4/23</a:t>
+              <a:t>9/5/23</a:t>
             </a:fld>
             <a:endParaRPr lang="en-US"/>
           </a:p>
@@ -24121,7 +24121,7 @@
           <a:p>
             <a:fld id="{075F2CDE-89C4-1B4C-87C9-7FAA4B7FC29C}" type="slidenum">
               <a:rPr lang="en-US" smtClean="0"/>
-              <a:t>2</a:t>
+              <a:t>1</a:t>
             </a:fld>
             <a:endParaRPr lang="en-US"/>
           </a:p>
@@ -24229,7 +24229,7 @@
           <a:p>
             <a:fld id="{A04CC895-3B19-1948-8213-A5CD87C5981C}" type="slidenum">
               <a:rPr lang="en-US" smtClean="0"/>
-              <a:t>3</a:t>
+              <a:t>2</a:t>
             </a:fld>
             <a:endParaRPr lang="en-US"/>
           </a:p>
@@ -24342,6 +24342,97 @@
           <a:p>
             <a:fld id="{A04CC895-3B19-1948-8213-A5CD87C5981C}" type="slidenum">
               <a:rPr lang="en-US" smtClean="0"/>
+              <a:t>3</a:t>
+            </a:fld>
+            <a:endParaRPr lang="en-US"/>
+          </a:p>
+        </p:txBody>
+      </p:sp>
+    </p:spTree>
+    <p:extLst>
+      <p:ext uri="{BB962C8B-B14F-4D97-AF65-F5344CB8AC3E}">
+        <p14:creationId xmlns:p14="http://schemas.microsoft.com/office/powerpoint/2010/main" val="2946510863"/>
+      </p:ext>
+    </p:extLst>
+  </p:cSld>
+  <p:clrMapOvr>
+    <a:masterClrMapping/>
+  </p:clrMapOvr>
+</p:notes>
+</file>
+
+<file path=ppt/notesSlides/notesSlide4.xml><?xml version="1.0" encoding="utf-8"?>
+<p:notes xmlns:a="http://schemas.openxmlformats.org/drawingml/2006/main" xmlns:r="http://schemas.openxmlformats.org/officeDocument/2006/relationships" xmlns:p="http://schemas.openxmlformats.org/presentationml/2006/main">
+  <p:cSld>
+    <p:spTree>
+      <p:nvGrpSpPr>
+        <p:cNvPr id="1" name=""/>
+        <p:cNvGrpSpPr/>
+        <p:nvPr/>
+      </p:nvGrpSpPr>
+      <p:grpSpPr>
+        <a:xfrm>
+          <a:off x="0" y="0"/>
+          <a:ext cx="0" cy="0"/>
+          <a:chOff x="0" y="0"/>
+          <a:chExt cx="0" cy="0"/>
+        </a:xfrm>
+      </p:grpSpPr>
+      <p:sp>
+        <p:nvSpPr>
+          <p:cNvPr id="2" name="Slide Image Placeholder 1"/>
+          <p:cNvSpPr>
+            <a:spLocks noGrp="1" noRot="1" noChangeAspect="1"/>
+          </p:cNvSpPr>
+          <p:nvPr>
+            <p:ph type="sldImg"/>
+          </p:nvPr>
+        </p:nvSpPr>
+        <p:spPr/>
+      </p:sp>
+      <p:sp>
+        <p:nvSpPr>
+          <p:cNvPr id="3" name="Notes Placeholder 2"/>
+          <p:cNvSpPr>
+            <a:spLocks noGrp="1"/>
+          </p:cNvSpPr>
+          <p:nvPr>
+            <p:ph type="body" idx="1"/>
+          </p:nvPr>
+        </p:nvSpPr>
+        <p:spPr/>
+        <p:txBody>
+          <a:bodyPr/>
+          <a:lstStyle/>
+          <a:p>
+            <a:r>
+              <a:rPr lang="en-US" dirty="0" err="1"/>
+              <a:t>study_design</a:t>
+            </a:r>
+            <a:endParaRPr lang="en-US" dirty="0"/>
+          </a:p>
+          <a:p>
+            <a:endParaRPr lang="en-US" dirty="0"/>
+          </a:p>
+        </p:txBody>
+      </p:sp>
+      <p:sp>
+        <p:nvSpPr>
+          <p:cNvPr id="4" name="Slide Number Placeholder 3"/>
+          <p:cNvSpPr>
+            <a:spLocks noGrp="1"/>
+          </p:cNvSpPr>
+          <p:nvPr>
+            <p:ph type="sldNum" sz="quarter" idx="5"/>
+          </p:nvPr>
+        </p:nvSpPr>
+        <p:spPr/>
+        <p:txBody>
+          <a:bodyPr/>
+          <a:lstStyle/>
+          <a:p>
+            <a:fld id="{A04CC895-3B19-1948-8213-A5CD87C5981C}" type="slidenum">
+              <a:rPr lang="en-US" smtClean="0"/>
               <a:t>4</a:t>
             </a:fld>
             <a:endParaRPr lang="en-US"/>
@@ -24351,7 +24442,7 @@
     </p:spTree>
     <p:extLst>
       <p:ext uri="{BB962C8B-B14F-4D97-AF65-F5344CB8AC3E}">
-        <p14:creationId xmlns:p14="http://schemas.microsoft.com/office/powerpoint/2010/main" val="2946510863"/>
+        <p14:creationId xmlns:p14="http://schemas.microsoft.com/office/powerpoint/2010/main" val="2488545262"/>
       </p:ext>
     </p:extLst>
   </p:cSld>
@@ -24508,7 +24599,7 @@
           <a:p>
             <a:fld id="{97E5D4AC-B265-BC46-B8CB-964562500F15}" type="datetimeFigureOut">
               <a:rPr lang="en-US" smtClean="0"/>
-              <a:t>9/4/23</a:t>
+              <a:t>9/5/23</a:t>
             </a:fld>
             <a:endParaRPr lang="en-US"/>
           </a:p>
@@ -24745,7 +24836,7 @@
             <a:fld id="{97E5D4AC-B265-BC46-B8CB-964562500F15}" type="datetimeFigureOut">
               <a:rPr lang="en-US" smtClean="0"/>
               <a:pPr/>
-              <a:t>9/4/23</a:t>
+              <a:t>9/5/23</a:t>
             </a:fld>
             <a:endParaRPr lang="en-US"/>
           </a:p>
@@ -25005,7 +25096,7 @@
             <a:fld id="{97E5D4AC-B265-BC46-B8CB-964562500F15}" type="datetimeFigureOut">
               <a:rPr lang="en-US" smtClean="0"/>
               <a:pPr/>
-              <a:t>9/4/23</a:t>
+              <a:t>9/5/23</a:t>
             </a:fld>
             <a:endParaRPr lang="en-US"/>
           </a:p>
@@ -25248,7 +25339,7 @@
           <a:p>
             <a:fld id="{97E5D4AC-B265-BC46-B8CB-964562500F15}" type="datetimeFigureOut">
               <a:rPr lang="en-US" smtClean="0"/>
-              <a:t>9/4/23</a:t>
+              <a:t>9/5/23</a:t>
             </a:fld>
             <a:endParaRPr lang="en-US"/>
           </a:p>
@@ -25533,7 +25624,7 @@
             <a:fld id="{97E5D4AC-B265-BC46-B8CB-964562500F15}" type="datetimeFigureOut">
               <a:rPr lang="en-US" smtClean="0"/>
               <a:pPr/>
-              <a:t>9/4/23</a:t>
+              <a:t>9/5/23</a:t>
             </a:fld>
             <a:endParaRPr lang="en-US"/>
           </a:p>
@@ -25876,7 +25967,7 @@
             <a:fld id="{97E5D4AC-B265-BC46-B8CB-964562500F15}" type="datetimeFigureOut">
               <a:rPr lang="en-US" smtClean="0"/>
               <a:pPr/>
-              <a:t>9/4/23</a:t>
+              <a:t>9/5/23</a:t>
             </a:fld>
             <a:endParaRPr lang="en-US"/>
           </a:p>
@@ -26370,7 +26461,7 @@
             <a:fld id="{97E5D4AC-B265-BC46-B8CB-964562500F15}" type="datetimeFigureOut">
               <a:rPr lang="en-US" smtClean="0"/>
               <a:pPr/>
-              <a:t>9/4/23</a:t>
+              <a:t>9/5/23</a:t>
             </a:fld>
             <a:endParaRPr lang="en-US"/>
           </a:p>
@@ -26537,7 +26628,7 @@
             <a:fld id="{97E5D4AC-B265-BC46-B8CB-964562500F15}" type="datetimeFigureOut">
               <a:rPr lang="en-US" smtClean="0"/>
               <a:pPr/>
-              <a:t>9/4/23</a:t>
+              <a:t>9/5/23</a:t>
             </a:fld>
             <a:endParaRPr lang="en-US"/>
           </a:p>
@@ -26670,7 +26761,7 @@
             <a:fld id="{97E5D4AC-B265-BC46-B8CB-964562500F15}" type="datetimeFigureOut">
               <a:rPr lang="en-US" smtClean="0"/>
               <a:pPr/>
-              <a:t>9/4/23</a:t>
+              <a:t>9/5/23</a:t>
             </a:fld>
             <a:endParaRPr lang="en-US"/>
           </a:p>
@@ -27015,7 +27106,7 @@
             <a:fld id="{97E5D4AC-B265-BC46-B8CB-964562500F15}" type="datetimeFigureOut">
               <a:rPr lang="en-US" smtClean="0"/>
               <a:pPr/>
-              <a:t>9/4/23</a:t>
+              <a:t>9/5/23</a:t>
             </a:fld>
             <a:endParaRPr lang="en-US"/>
           </a:p>
@@ -27329,7 +27420,7 @@
             <a:fld id="{97E5D4AC-B265-BC46-B8CB-964562500F15}" type="datetimeFigureOut">
               <a:rPr lang="en-US" smtClean="0"/>
               <a:pPr/>
-              <a:t>9/4/23</a:t>
+              <a:t>9/5/23</a:t>
             </a:fld>
             <a:endParaRPr lang="en-US"/>
           </a:p>
@@ -27585,7 +27676,7 @@
             <a:fld id="{97E5D4AC-B265-BC46-B8CB-964562500F15}" type="datetimeFigureOut">
               <a:rPr lang="en-US" smtClean="0"/>
               <a:pPr/>
-              <a:t>9/4/23</a:t>
+              <a:t>9/5/23</a:t>
             </a:fld>
             <a:endParaRPr lang="en-US"/>
           </a:p>
@@ -27989,144 +28080,6 @@
 </file>
 
 <file path=ppt/slides/slide1.xml><?xml version="1.0" encoding="utf-8"?>
-<p:sld xmlns:a="http://schemas.openxmlformats.org/drawingml/2006/main" xmlns:r="http://schemas.openxmlformats.org/officeDocument/2006/relationships" xmlns:p="http://schemas.openxmlformats.org/presentationml/2006/main" show="0">
-  <p:cSld>
-    <p:spTree>
-      <p:nvGrpSpPr>
-        <p:cNvPr id="1" name=""/>
-        <p:cNvGrpSpPr/>
-        <p:nvPr/>
-      </p:nvGrpSpPr>
-      <p:grpSpPr>
-        <a:xfrm>
-          <a:off x="0" y="0"/>
-          <a:ext cx="0" cy="0"/>
-          <a:chOff x="0" y="0"/>
-          <a:chExt cx="0" cy="0"/>
-        </a:xfrm>
-      </p:grpSpPr>
-      <p:sp>
-        <p:nvSpPr>
-          <p:cNvPr id="2" name="Title 1">
-            <a:extLst>
-              <a:ext uri="{FF2B5EF4-FFF2-40B4-BE49-F238E27FC236}">
-                <a16:creationId xmlns:a16="http://schemas.microsoft.com/office/drawing/2014/main" id="{1F02248C-71C3-437E-DD52-BD453112327E}"/>
-              </a:ext>
-            </a:extLst>
-          </p:cNvPr>
-          <p:cNvSpPr>
-            <a:spLocks noGrp="1"/>
-          </p:cNvSpPr>
-          <p:nvPr>
-            <p:ph type="title"/>
-          </p:nvPr>
-        </p:nvSpPr>
-        <p:spPr/>
-        <p:txBody>
-          <a:bodyPr/>
-          <a:lstStyle/>
-          <a:p>
-            <a:r>
-              <a:rPr lang="en-US" dirty="0">
-                <a:latin typeface="Avenir Book" panose="02000503020000020003" pitchFamily="2" charset="0"/>
-              </a:rPr>
-              <a:t>Development Version</a:t>
-            </a:r>
-          </a:p>
-        </p:txBody>
-      </p:sp>
-      <p:sp>
-        <p:nvSpPr>
-          <p:cNvPr id="3" name="Content Placeholder 2">
-            <a:extLst>
-              <a:ext uri="{FF2B5EF4-FFF2-40B4-BE49-F238E27FC236}">
-                <a16:creationId xmlns:a16="http://schemas.microsoft.com/office/drawing/2014/main" id="{81869D34-3F78-540D-7369-25CD001C907E}"/>
-              </a:ext>
-            </a:extLst>
-          </p:cNvPr>
-          <p:cNvSpPr>
-            <a:spLocks noGrp="1"/>
-          </p:cNvSpPr>
-          <p:nvPr>
-            <p:ph idx="1"/>
-          </p:nvPr>
-        </p:nvSpPr>
-        <p:spPr/>
-        <p:txBody>
-          <a:bodyPr/>
-          <a:lstStyle/>
-          <a:p>
-            <a:r>
-              <a:rPr lang="en-US" dirty="0">
-                <a:latin typeface="Avenir Book" panose="02000503020000020003" pitchFamily="2" charset="0"/>
-              </a:rPr>
-              <a:t>This is the development version of the presentation. Do </a:t>
-            </a:r>
-            <a:r>
-              <a:rPr lang="en-US" u="sng" dirty="0">
-                <a:latin typeface="Avenir Book" panose="02000503020000020003" pitchFamily="2" charset="0"/>
-              </a:rPr>
-              <a:t>not</a:t>
-            </a:r>
-            <a:r>
-              <a:rPr lang="en-US" dirty="0">
-                <a:latin typeface="Avenir Book" panose="02000503020000020003" pitchFamily="2" charset="0"/>
-              </a:rPr>
-              <a:t> post on Canvas. </a:t>
-            </a:r>
-          </a:p>
-          <a:p>
-            <a:r>
-              <a:rPr lang="en-US" dirty="0">
-                <a:latin typeface="Avenir Book" panose="02000503020000020003" pitchFamily="2" charset="0"/>
-              </a:rPr>
-              <a:t>Instead, export to pdf and post a link to the pdf on Canvas.</a:t>
-            </a:r>
-          </a:p>
-          <a:p>
-            <a:r>
-              <a:rPr lang="en-US" dirty="0">
-                <a:latin typeface="Avenir Book" panose="02000503020000020003" pitchFamily="2" charset="0"/>
-              </a:rPr>
-              <a:t>Hidden slides, comments, and slide notes will </a:t>
-            </a:r>
-            <a:r>
-              <a:rPr lang="en-US" u="sng" dirty="0">
-                <a:latin typeface="Avenir Book" panose="02000503020000020003" pitchFamily="2" charset="0"/>
-              </a:rPr>
-              <a:t>not</a:t>
-            </a:r>
-            <a:r>
-              <a:rPr lang="en-US" dirty="0">
-                <a:latin typeface="Avenir Book" panose="02000503020000020003" pitchFamily="2" charset="0"/>
-              </a:rPr>
-              <a:t> be included in the pdf. </a:t>
-            </a:r>
-          </a:p>
-          <a:p>
-            <a:r>
-              <a:rPr lang="en-US" dirty="0">
-                <a:latin typeface="Avenir Book" panose="02000503020000020003" pitchFamily="2" charset="0"/>
-              </a:rPr>
-              <a:t>If you also post a recording of the lecture, then there should be no reason why the students need the notes.</a:t>
-            </a:r>
-          </a:p>
-        </p:txBody>
-      </p:sp>
-    </p:spTree>
-    <p:extLst>
-      <p:ext uri="{BB962C8B-B14F-4D97-AF65-F5344CB8AC3E}">
-        <p14:creationId xmlns:p14="http://schemas.microsoft.com/office/powerpoint/2010/main" val="34412781"/>
-      </p:ext>
-    </p:extLst>
-  </p:cSld>
-  <p:clrMapOvr>
-    <a:masterClrMapping/>
-  </p:clrMapOvr>
-</p:sld>
-</file>
-
-<file path=ppt/slides/slide2.xml><?xml version="1.0" encoding="utf-8"?>
 <p:sld xmlns:a="http://schemas.openxmlformats.org/drawingml/2006/main" xmlns:r="http://schemas.openxmlformats.org/officeDocument/2006/relationships" xmlns:p="http://schemas.openxmlformats.org/presentationml/2006/main">
   <p:cSld>
     <p:spTree>
@@ -28801,7 +28754,7 @@
 </p:sld>
 </file>
 
-<file path=ppt/slides/slide3.xml><?xml version="1.0" encoding="utf-8"?>
+<file path=ppt/slides/slide2.xml><?xml version="1.0" encoding="utf-8"?>
 <p:sld xmlns:a="http://schemas.openxmlformats.org/drawingml/2006/main" xmlns:r="http://schemas.openxmlformats.org/officeDocument/2006/relationships" xmlns:p="http://schemas.openxmlformats.org/presentationml/2006/main">
   <p:cSld>
     <p:spTree>
@@ -29912,7 +29865,7 @@
 </p:sld>
 </file>
 
-<file path=ppt/slides/slide4.xml><?xml version="1.0" encoding="utf-8"?>
+<file path=ppt/slides/slide3.xml><?xml version="1.0" encoding="utf-8"?>
 <p:sld xmlns:a="http://schemas.openxmlformats.org/drawingml/2006/main" xmlns:r="http://schemas.openxmlformats.org/officeDocument/2006/relationships" xmlns:p="http://schemas.openxmlformats.org/presentationml/2006/main">
   <p:cSld>
     <p:spTree>
@@ -29972,6 +29925,1199 @@
       <p188:commentRel xmlns:p188="http://schemas.microsoft.com/office/powerpoint/2018/8/main" r:id="rId3"/>
     </p:ext>
   </p:extLst>
+</p:sld>
+</file>
+
+<file path=ppt/slides/slide4.xml><?xml version="1.0" encoding="utf-8"?>
+<p:sld xmlns:a="http://schemas.openxmlformats.org/drawingml/2006/main" xmlns:r="http://schemas.openxmlformats.org/officeDocument/2006/relationships" xmlns:p="http://schemas.openxmlformats.org/presentationml/2006/main">
+  <p:cSld>
+    <p:spTree>
+      <p:nvGrpSpPr>
+        <p:cNvPr id="1" name=""/>
+        <p:cNvGrpSpPr/>
+        <p:nvPr/>
+      </p:nvGrpSpPr>
+      <p:grpSpPr>
+        <a:xfrm>
+          <a:off x="0" y="0"/>
+          <a:ext cx="0" cy="0"/>
+          <a:chOff x="0" y="0"/>
+          <a:chExt cx="0" cy="0"/>
+        </a:xfrm>
+      </p:grpSpPr>
+      <p:sp>
+        <p:nvSpPr>
+          <p:cNvPr id="8" name="Rounded Rectangle 7">
+            <a:extLst>
+              <a:ext uri="{FF2B5EF4-FFF2-40B4-BE49-F238E27FC236}">
+                <a16:creationId xmlns:a16="http://schemas.microsoft.com/office/drawing/2014/main" id="{25DD29AC-569F-FA43-80A1-5DF0107537CA}"/>
+              </a:ext>
+            </a:extLst>
+          </p:cNvPr>
+          <p:cNvSpPr/>
+          <p:nvPr/>
+        </p:nvSpPr>
+        <p:spPr>
+          <a:xfrm>
+            <a:off x="6335482" y="184485"/>
+            <a:ext cx="1506848" cy="713874"/>
+          </a:xfrm>
+          <a:prstGeom prst="roundRect">
+            <a:avLst/>
+          </a:prstGeom>
+          <a:noFill/>
+          <a:ln w="38100">
+            <a:solidFill>
+              <a:schemeClr val="tx1"/>
+            </a:solidFill>
+          </a:ln>
+        </p:spPr>
+        <p:style>
+          <a:lnRef idx="2">
+            <a:schemeClr val="accent1">
+              <a:shade val="50000"/>
+            </a:schemeClr>
+          </a:lnRef>
+          <a:fillRef idx="1">
+            <a:schemeClr val="accent1"/>
+          </a:fillRef>
+          <a:effectRef idx="0">
+            <a:schemeClr val="accent1"/>
+          </a:effectRef>
+          <a:fontRef idx="minor">
+            <a:schemeClr val="lt1"/>
+          </a:fontRef>
+        </p:style>
+        <p:txBody>
+          <a:bodyPr rtlCol="0" anchor="ctr"/>
+          <a:lstStyle/>
+          <a:p>
+            <a:pPr algn="ctr"/>
+            <a:r>
+              <a:rPr lang="en-US" sz="2000" dirty="0">
+                <a:solidFill>
+                  <a:schemeClr val="tx1"/>
+                </a:solidFill>
+                <a:latin typeface="Avenir Book" panose="02000503020000020003" pitchFamily="2" charset="0"/>
+              </a:rPr>
+              <a:t>Measures</a:t>
+            </a:r>
+          </a:p>
+        </p:txBody>
+      </p:sp>
+      <p:sp>
+        <p:nvSpPr>
+          <p:cNvPr id="12" name="Rounded Rectangle 11">
+            <a:extLst>
+              <a:ext uri="{FF2B5EF4-FFF2-40B4-BE49-F238E27FC236}">
+                <a16:creationId xmlns:a16="http://schemas.microsoft.com/office/drawing/2014/main" id="{A5675D73-E8A1-5C46-B40B-113023CD79D5}"/>
+              </a:ext>
+            </a:extLst>
+          </p:cNvPr>
+          <p:cNvSpPr/>
+          <p:nvPr/>
+        </p:nvSpPr>
+        <p:spPr>
+          <a:xfrm>
+            <a:off x="3039208" y="1643811"/>
+            <a:ext cx="2060301" cy="713874"/>
+          </a:xfrm>
+          <a:prstGeom prst="roundRect">
+            <a:avLst/>
+          </a:prstGeom>
+          <a:noFill/>
+          <a:ln w="38100">
+            <a:solidFill>
+              <a:schemeClr val="accent2"/>
+            </a:solidFill>
+          </a:ln>
+        </p:spPr>
+        <p:style>
+          <a:lnRef idx="2">
+            <a:schemeClr val="accent1">
+              <a:shade val="50000"/>
+            </a:schemeClr>
+          </a:lnRef>
+          <a:fillRef idx="1">
+            <a:schemeClr val="accent1"/>
+          </a:fillRef>
+          <a:effectRef idx="0">
+            <a:schemeClr val="accent1"/>
+          </a:effectRef>
+          <a:fontRef idx="minor">
+            <a:schemeClr val="lt1"/>
+          </a:fontRef>
+        </p:style>
+        <p:txBody>
+          <a:bodyPr rtlCol="0" anchor="ctr"/>
+          <a:lstStyle/>
+          <a:p>
+            <a:pPr algn="ctr"/>
+            <a:r>
+              <a:rPr lang="en-US" sz="2000" dirty="0">
+                <a:solidFill>
+                  <a:schemeClr val="tx1"/>
+                </a:solidFill>
+                <a:latin typeface="Avenir Book" panose="02000503020000020003" pitchFamily="2" charset="0"/>
+              </a:rPr>
+              <a:t>Observations</a:t>
+            </a:r>
+          </a:p>
+        </p:txBody>
+      </p:sp>
+      <p:sp>
+        <p:nvSpPr>
+          <p:cNvPr id="13" name="Rounded Rectangle 12">
+            <a:extLst>
+              <a:ext uri="{FF2B5EF4-FFF2-40B4-BE49-F238E27FC236}">
+                <a16:creationId xmlns:a16="http://schemas.microsoft.com/office/drawing/2014/main" id="{8AA3EF81-20D2-F04E-8340-4FFD9051622E}"/>
+              </a:ext>
+            </a:extLst>
+          </p:cNvPr>
+          <p:cNvSpPr/>
+          <p:nvPr/>
+        </p:nvSpPr>
+        <p:spPr>
+          <a:xfrm>
+            <a:off x="9310915" y="1643811"/>
+            <a:ext cx="1827690" cy="713874"/>
+          </a:xfrm>
+          <a:prstGeom prst="roundRect">
+            <a:avLst/>
+          </a:prstGeom>
+          <a:noFill/>
+          <a:ln w="38100">
+            <a:solidFill>
+              <a:schemeClr val="accent5"/>
+            </a:solidFill>
+          </a:ln>
+        </p:spPr>
+        <p:style>
+          <a:lnRef idx="2">
+            <a:schemeClr val="accent1">
+              <a:shade val="50000"/>
+            </a:schemeClr>
+          </a:lnRef>
+          <a:fillRef idx="1">
+            <a:schemeClr val="accent1"/>
+          </a:fillRef>
+          <a:effectRef idx="0">
+            <a:schemeClr val="accent1"/>
+          </a:effectRef>
+          <a:fontRef idx="minor">
+            <a:schemeClr val="lt1"/>
+          </a:fontRef>
+        </p:style>
+        <p:txBody>
+          <a:bodyPr rtlCol="0" anchor="ctr"/>
+          <a:lstStyle/>
+          <a:p>
+            <a:pPr algn="ctr"/>
+            <a:r>
+              <a:rPr lang="en-US" sz="2000" dirty="0">
+                <a:solidFill>
+                  <a:schemeClr val="tx1"/>
+                </a:solidFill>
+                <a:latin typeface="Avenir Book" panose="02000503020000020003" pitchFamily="2" charset="0"/>
+              </a:rPr>
+              <a:t>Experiments</a:t>
+            </a:r>
+          </a:p>
+        </p:txBody>
+      </p:sp>
+      <p:sp>
+        <p:nvSpPr>
+          <p:cNvPr id="14" name="Rounded Rectangle 13">
+            <a:extLst>
+              <a:ext uri="{FF2B5EF4-FFF2-40B4-BE49-F238E27FC236}">
+                <a16:creationId xmlns:a16="http://schemas.microsoft.com/office/drawing/2014/main" id="{C71ED6EE-4C7D-2542-90AA-1AAB6926381A}"/>
+              </a:ext>
+            </a:extLst>
+          </p:cNvPr>
+          <p:cNvSpPr/>
+          <p:nvPr/>
+        </p:nvSpPr>
+        <p:spPr>
+          <a:xfrm>
+            <a:off x="10323094" y="3119181"/>
+            <a:ext cx="1827690" cy="1143000"/>
+          </a:xfrm>
+          <a:prstGeom prst="roundRect">
+            <a:avLst/>
+          </a:prstGeom>
+          <a:noFill/>
+          <a:ln w="38100">
+            <a:solidFill>
+              <a:schemeClr val="accent5"/>
+            </a:solidFill>
+          </a:ln>
+        </p:spPr>
+        <p:style>
+          <a:lnRef idx="2">
+            <a:schemeClr val="accent1">
+              <a:shade val="50000"/>
+            </a:schemeClr>
+          </a:lnRef>
+          <a:fillRef idx="1">
+            <a:schemeClr val="accent1"/>
+          </a:fillRef>
+          <a:effectRef idx="0">
+            <a:schemeClr val="accent1"/>
+          </a:effectRef>
+          <a:fontRef idx="minor">
+            <a:schemeClr val="lt1"/>
+          </a:fontRef>
+        </p:style>
+        <p:txBody>
+          <a:bodyPr rtlCol="0" anchor="ctr"/>
+          <a:lstStyle/>
+          <a:p>
+            <a:pPr algn="ctr"/>
+            <a:r>
+              <a:rPr lang="en-US" sz="2000" dirty="0">
+                <a:solidFill>
+                  <a:schemeClr val="tx1"/>
+                </a:solidFill>
+                <a:latin typeface="Avenir Book" panose="02000503020000020003" pitchFamily="2" charset="0"/>
+              </a:rPr>
+              <a:t>Randomized</a:t>
+            </a:r>
+          </a:p>
+        </p:txBody>
+      </p:sp>
+      <p:sp>
+        <p:nvSpPr>
+          <p:cNvPr id="15" name="Rounded Rectangle 14">
+            <a:extLst>
+              <a:ext uri="{FF2B5EF4-FFF2-40B4-BE49-F238E27FC236}">
+                <a16:creationId xmlns:a16="http://schemas.microsoft.com/office/drawing/2014/main" id="{4FD360D3-FA08-404B-BCA7-1251E80F2247}"/>
+              </a:ext>
+            </a:extLst>
+          </p:cNvPr>
+          <p:cNvSpPr/>
+          <p:nvPr/>
+        </p:nvSpPr>
+        <p:spPr>
+          <a:xfrm>
+            <a:off x="8298736" y="3119181"/>
+            <a:ext cx="1832256" cy="1143000"/>
+          </a:xfrm>
+          <a:prstGeom prst="roundRect">
+            <a:avLst/>
+          </a:prstGeom>
+          <a:noFill/>
+          <a:ln w="38100">
+            <a:solidFill>
+              <a:schemeClr val="accent5"/>
+            </a:solidFill>
+          </a:ln>
+        </p:spPr>
+        <p:style>
+          <a:lnRef idx="2">
+            <a:schemeClr val="accent1">
+              <a:shade val="50000"/>
+            </a:schemeClr>
+          </a:lnRef>
+          <a:fillRef idx="1">
+            <a:schemeClr val="accent1"/>
+          </a:fillRef>
+          <a:effectRef idx="0">
+            <a:schemeClr val="accent1"/>
+          </a:effectRef>
+          <a:fontRef idx="minor">
+            <a:schemeClr val="lt1"/>
+          </a:fontRef>
+        </p:style>
+        <p:txBody>
+          <a:bodyPr rtlCol="0" anchor="ctr"/>
+          <a:lstStyle/>
+          <a:p>
+            <a:pPr algn="ctr"/>
+            <a:r>
+              <a:rPr lang="en-US" sz="2000" dirty="0">
+                <a:solidFill>
+                  <a:schemeClr val="tx1"/>
+                </a:solidFill>
+                <a:latin typeface="Avenir Book" panose="02000503020000020003" pitchFamily="2" charset="0"/>
+              </a:rPr>
+              <a:t>Non-randomized</a:t>
+            </a:r>
+          </a:p>
+        </p:txBody>
+      </p:sp>
+      <p:sp>
+        <p:nvSpPr>
+          <p:cNvPr id="16" name="Rounded Rectangle 15">
+            <a:extLst>
+              <a:ext uri="{FF2B5EF4-FFF2-40B4-BE49-F238E27FC236}">
+                <a16:creationId xmlns:a16="http://schemas.microsoft.com/office/drawing/2014/main" id="{891E744D-6A73-D24A-9960-29A8F8DAFE37}"/>
+              </a:ext>
+            </a:extLst>
+          </p:cNvPr>
+          <p:cNvSpPr/>
+          <p:nvPr/>
+        </p:nvSpPr>
+        <p:spPr>
+          <a:xfrm>
+            <a:off x="32084" y="3119181"/>
+            <a:ext cx="1832256" cy="1143000"/>
+          </a:xfrm>
+          <a:prstGeom prst="roundRect">
+            <a:avLst/>
+          </a:prstGeom>
+          <a:noFill/>
+          <a:ln w="38100">
+            <a:solidFill>
+              <a:schemeClr val="accent2"/>
+            </a:solidFill>
+          </a:ln>
+        </p:spPr>
+        <p:style>
+          <a:lnRef idx="2">
+            <a:schemeClr val="accent1">
+              <a:shade val="50000"/>
+            </a:schemeClr>
+          </a:lnRef>
+          <a:fillRef idx="1">
+            <a:schemeClr val="accent1"/>
+          </a:fillRef>
+          <a:effectRef idx="0">
+            <a:schemeClr val="accent1"/>
+          </a:effectRef>
+          <a:fontRef idx="minor">
+            <a:schemeClr val="lt1"/>
+          </a:fontRef>
+        </p:style>
+        <p:txBody>
+          <a:bodyPr rtlCol="0" anchor="ctr"/>
+          <a:lstStyle/>
+          <a:p>
+            <a:pPr algn="ctr"/>
+            <a:r>
+              <a:rPr lang="en-US" sz="2000" dirty="0">
+                <a:solidFill>
+                  <a:schemeClr val="tx1"/>
+                </a:solidFill>
+                <a:latin typeface="Avenir Book" panose="02000503020000020003" pitchFamily="2" charset="0"/>
+              </a:rPr>
+              <a:t>Case</a:t>
+            </a:r>
+          </a:p>
+          <a:p>
+            <a:pPr algn="ctr"/>
+            <a:r>
+              <a:rPr lang="en-US" sz="2000" dirty="0">
+                <a:solidFill>
+                  <a:schemeClr val="tx1"/>
+                </a:solidFill>
+                <a:latin typeface="Avenir Book" panose="02000503020000020003" pitchFamily="2" charset="0"/>
+              </a:rPr>
+              <a:t>Descriptions</a:t>
+            </a:r>
+          </a:p>
+        </p:txBody>
+      </p:sp>
+      <p:sp>
+        <p:nvSpPr>
+          <p:cNvPr id="17" name="Rounded Rectangle 16">
+            <a:extLst>
+              <a:ext uri="{FF2B5EF4-FFF2-40B4-BE49-F238E27FC236}">
+                <a16:creationId xmlns:a16="http://schemas.microsoft.com/office/drawing/2014/main" id="{DF0642D2-01E9-2F4F-AF60-09A77FDD05A5}"/>
+              </a:ext>
+            </a:extLst>
+          </p:cNvPr>
+          <p:cNvSpPr/>
+          <p:nvPr/>
+        </p:nvSpPr>
+        <p:spPr>
+          <a:xfrm>
+            <a:off x="2056444" y="3119181"/>
+            <a:ext cx="1554480" cy="1143000"/>
+          </a:xfrm>
+          <a:prstGeom prst="roundRect">
+            <a:avLst/>
+          </a:prstGeom>
+          <a:noFill/>
+          <a:ln w="38100">
+            <a:solidFill>
+              <a:schemeClr val="accent2"/>
+            </a:solidFill>
+          </a:ln>
+        </p:spPr>
+        <p:style>
+          <a:lnRef idx="2">
+            <a:schemeClr val="accent1">
+              <a:shade val="50000"/>
+            </a:schemeClr>
+          </a:lnRef>
+          <a:fillRef idx="1">
+            <a:schemeClr val="accent1"/>
+          </a:fillRef>
+          <a:effectRef idx="0">
+            <a:schemeClr val="accent1"/>
+          </a:effectRef>
+          <a:fontRef idx="minor">
+            <a:schemeClr val="lt1"/>
+          </a:fontRef>
+        </p:style>
+        <p:txBody>
+          <a:bodyPr rtlCol="0" anchor="ctr"/>
+          <a:lstStyle/>
+          <a:p>
+            <a:pPr algn="ctr"/>
+            <a:r>
+              <a:rPr lang="en-US" sz="2000" dirty="0">
+                <a:solidFill>
+                  <a:schemeClr val="tx1"/>
+                </a:solidFill>
+                <a:latin typeface="Avenir Book" panose="02000503020000020003" pitchFamily="2" charset="0"/>
+              </a:rPr>
+              <a:t>Ecological</a:t>
+            </a:r>
+          </a:p>
+        </p:txBody>
+      </p:sp>
+      <p:sp>
+        <p:nvSpPr>
+          <p:cNvPr id="18" name="Rounded Rectangle 17">
+            <a:extLst>
+              <a:ext uri="{FF2B5EF4-FFF2-40B4-BE49-F238E27FC236}">
+                <a16:creationId xmlns:a16="http://schemas.microsoft.com/office/drawing/2014/main" id="{22F5C8E7-C6E3-C64F-8EF6-33EF89DA085C}"/>
+              </a:ext>
+            </a:extLst>
+          </p:cNvPr>
+          <p:cNvSpPr/>
+          <p:nvPr/>
+        </p:nvSpPr>
+        <p:spPr>
+          <a:xfrm>
+            <a:off x="3803028" y="3119181"/>
+            <a:ext cx="1506848" cy="1143000"/>
+          </a:xfrm>
+          <a:prstGeom prst="roundRect">
+            <a:avLst/>
+          </a:prstGeom>
+          <a:noFill/>
+          <a:ln w="38100">
+            <a:solidFill>
+              <a:schemeClr val="accent2"/>
+            </a:solidFill>
+          </a:ln>
+        </p:spPr>
+        <p:style>
+          <a:lnRef idx="2">
+            <a:schemeClr val="accent1">
+              <a:shade val="50000"/>
+            </a:schemeClr>
+          </a:lnRef>
+          <a:fillRef idx="1">
+            <a:schemeClr val="accent1"/>
+          </a:fillRef>
+          <a:effectRef idx="0">
+            <a:schemeClr val="accent1"/>
+          </a:effectRef>
+          <a:fontRef idx="minor">
+            <a:schemeClr val="lt1"/>
+          </a:fontRef>
+        </p:style>
+        <p:txBody>
+          <a:bodyPr rtlCol="0" anchor="ctr"/>
+          <a:lstStyle/>
+          <a:p>
+            <a:pPr algn="ctr"/>
+            <a:r>
+              <a:rPr lang="en-US" sz="2000" dirty="0">
+                <a:solidFill>
+                  <a:schemeClr val="tx1"/>
+                </a:solidFill>
+                <a:latin typeface="Avenir Book" panose="02000503020000020003" pitchFamily="2" charset="0"/>
+              </a:rPr>
+              <a:t>Cross-sectional</a:t>
+            </a:r>
+          </a:p>
+        </p:txBody>
+      </p:sp>
+      <p:sp>
+        <p:nvSpPr>
+          <p:cNvPr id="20" name="Rounded Rectangle 19">
+            <a:extLst>
+              <a:ext uri="{FF2B5EF4-FFF2-40B4-BE49-F238E27FC236}">
+                <a16:creationId xmlns:a16="http://schemas.microsoft.com/office/drawing/2014/main" id="{6FE352AF-8C33-8845-B8B3-A17D7A8E0039}"/>
+              </a:ext>
+            </a:extLst>
+          </p:cNvPr>
+          <p:cNvSpPr/>
+          <p:nvPr/>
+        </p:nvSpPr>
+        <p:spPr>
+          <a:xfrm>
+            <a:off x="6882310" y="3119181"/>
+            <a:ext cx="1224322" cy="1143000"/>
+          </a:xfrm>
+          <a:prstGeom prst="roundRect">
+            <a:avLst/>
+          </a:prstGeom>
+          <a:noFill/>
+          <a:ln w="38100">
+            <a:solidFill>
+              <a:schemeClr val="accent2"/>
+            </a:solidFill>
+          </a:ln>
+        </p:spPr>
+        <p:style>
+          <a:lnRef idx="2">
+            <a:schemeClr val="accent1">
+              <a:shade val="50000"/>
+            </a:schemeClr>
+          </a:lnRef>
+          <a:fillRef idx="1">
+            <a:schemeClr val="accent1"/>
+          </a:fillRef>
+          <a:effectRef idx="0">
+            <a:schemeClr val="accent1"/>
+          </a:effectRef>
+          <a:fontRef idx="minor">
+            <a:schemeClr val="lt1"/>
+          </a:fontRef>
+        </p:style>
+        <p:txBody>
+          <a:bodyPr rtlCol="0" anchor="ctr"/>
+          <a:lstStyle/>
+          <a:p>
+            <a:pPr algn="ctr"/>
+            <a:r>
+              <a:rPr lang="en-US" sz="2000" dirty="0">
+                <a:solidFill>
+                  <a:schemeClr val="tx1"/>
+                </a:solidFill>
+                <a:latin typeface="Avenir Book" panose="02000503020000020003" pitchFamily="2" charset="0"/>
+              </a:rPr>
+              <a:t>Cohort</a:t>
+            </a:r>
+          </a:p>
+        </p:txBody>
+      </p:sp>
+      <p:sp>
+        <p:nvSpPr>
+          <p:cNvPr id="21" name="Rounded Rectangle 20">
+            <a:extLst>
+              <a:ext uri="{FF2B5EF4-FFF2-40B4-BE49-F238E27FC236}">
+                <a16:creationId xmlns:a16="http://schemas.microsoft.com/office/drawing/2014/main" id="{D4CC5A03-1FDC-E04F-9BF2-F4FC156307F4}"/>
+              </a:ext>
+            </a:extLst>
+          </p:cNvPr>
+          <p:cNvSpPr/>
+          <p:nvPr/>
+        </p:nvSpPr>
+        <p:spPr>
+          <a:xfrm>
+            <a:off x="5501980" y="3119181"/>
+            <a:ext cx="1188226" cy="1143000"/>
+          </a:xfrm>
+          <a:prstGeom prst="roundRect">
+            <a:avLst/>
+          </a:prstGeom>
+          <a:noFill/>
+          <a:ln w="38100">
+            <a:solidFill>
+              <a:schemeClr val="accent2"/>
+            </a:solidFill>
+          </a:ln>
+        </p:spPr>
+        <p:style>
+          <a:lnRef idx="2">
+            <a:schemeClr val="accent1">
+              <a:shade val="50000"/>
+            </a:schemeClr>
+          </a:lnRef>
+          <a:fillRef idx="1">
+            <a:schemeClr val="accent1"/>
+          </a:fillRef>
+          <a:effectRef idx="0">
+            <a:schemeClr val="accent1"/>
+          </a:effectRef>
+          <a:fontRef idx="minor">
+            <a:schemeClr val="lt1"/>
+          </a:fontRef>
+        </p:style>
+        <p:txBody>
+          <a:bodyPr rtlCol="0" anchor="ctr"/>
+          <a:lstStyle/>
+          <a:p>
+            <a:pPr algn="ctr"/>
+            <a:r>
+              <a:rPr lang="en-US" sz="2000" dirty="0">
+                <a:solidFill>
+                  <a:schemeClr val="tx1"/>
+                </a:solidFill>
+                <a:latin typeface="Avenir Book" panose="02000503020000020003" pitchFamily="2" charset="0"/>
+              </a:rPr>
+              <a:t>Case-control</a:t>
+            </a:r>
+          </a:p>
+        </p:txBody>
+      </p:sp>
+      <p:cxnSp>
+        <p:nvCxnSpPr>
+          <p:cNvPr id="22" name="Elbow Connector 21">
+            <a:extLst>
+              <a:ext uri="{FF2B5EF4-FFF2-40B4-BE49-F238E27FC236}">
+                <a16:creationId xmlns:a16="http://schemas.microsoft.com/office/drawing/2014/main" id="{E81CBB27-F204-7240-94F5-8D1D169338E0}"/>
+              </a:ext>
+            </a:extLst>
+          </p:cNvPr>
+          <p:cNvCxnSpPr>
+            <a:stCxn id="8" idx="2"/>
+            <a:endCxn id="12" idx="0"/>
+          </p:cNvCxnSpPr>
+          <p:nvPr/>
+        </p:nvCxnSpPr>
+        <p:spPr>
+          <a:xfrm rot="5400000">
+            <a:off x="5206407" y="-238688"/>
+            <a:ext cx="745452" cy="3019547"/>
+          </a:xfrm>
+          <a:prstGeom prst="bentConnector3">
+            <a:avLst/>
+          </a:prstGeom>
+          <a:ln w="38100">
+            <a:solidFill>
+              <a:schemeClr val="tx1"/>
+            </a:solidFill>
+            <a:tailEnd type="triangle"/>
+          </a:ln>
+        </p:spPr>
+        <p:style>
+          <a:lnRef idx="1">
+            <a:schemeClr val="accent1"/>
+          </a:lnRef>
+          <a:fillRef idx="0">
+            <a:schemeClr val="accent1"/>
+          </a:fillRef>
+          <a:effectRef idx="0">
+            <a:schemeClr val="accent1"/>
+          </a:effectRef>
+          <a:fontRef idx="minor">
+            <a:schemeClr val="tx1"/>
+          </a:fontRef>
+        </p:style>
+      </p:cxnSp>
+      <p:cxnSp>
+        <p:nvCxnSpPr>
+          <p:cNvPr id="23" name="Elbow Connector 22">
+            <a:extLst>
+              <a:ext uri="{FF2B5EF4-FFF2-40B4-BE49-F238E27FC236}">
+                <a16:creationId xmlns:a16="http://schemas.microsoft.com/office/drawing/2014/main" id="{37519C07-AB60-0D4C-B3DD-02225D5B028A}"/>
+              </a:ext>
+            </a:extLst>
+          </p:cNvPr>
+          <p:cNvCxnSpPr>
+            <a:cxnSpLocks/>
+            <a:stCxn id="8" idx="2"/>
+            <a:endCxn id="13" idx="0"/>
+          </p:cNvCxnSpPr>
+          <p:nvPr/>
+        </p:nvCxnSpPr>
+        <p:spPr>
+          <a:xfrm rot="16200000" flipH="1">
+            <a:off x="8284107" y="-296842"/>
+            <a:ext cx="745452" cy="3135854"/>
+          </a:xfrm>
+          <a:prstGeom prst="bentConnector3">
+            <a:avLst>
+              <a:gd name="adj1" fmla="val 50000"/>
+            </a:avLst>
+          </a:prstGeom>
+          <a:ln w="38100">
+            <a:solidFill>
+              <a:schemeClr val="tx1"/>
+            </a:solidFill>
+            <a:tailEnd type="triangle"/>
+          </a:ln>
+        </p:spPr>
+        <p:style>
+          <a:lnRef idx="1">
+            <a:schemeClr val="accent1"/>
+          </a:lnRef>
+          <a:fillRef idx="0">
+            <a:schemeClr val="accent1"/>
+          </a:fillRef>
+          <a:effectRef idx="0">
+            <a:schemeClr val="accent1"/>
+          </a:effectRef>
+          <a:fontRef idx="minor">
+            <a:schemeClr val="tx1"/>
+          </a:fontRef>
+        </p:style>
+      </p:cxnSp>
+      <p:cxnSp>
+        <p:nvCxnSpPr>
+          <p:cNvPr id="27" name="Elbow Connector 26">
+            <a:extLst>
+              <a:ext uri="{FF2B5EF4-FFF2-40B4-BE49-F238E27FC236}">
+                <a16:creationId xmlns:a16="http://schemas.microsoft.com/office/drawing/2014/main" id="{3C4F9388-CB86-3743-A5FF-DB4BBDB577F2}"/>
+              </a:ext>
+            </a:extLst>
+          </p:cNvPr>
+          <p:cNvCxnSpPr>
+            <a:cxnSpLocks/>
+            <a:stCxn id="12" idx="2"/>
+            <a:endCxn id="16" idx="0"/>
+          </p:cNvCxnSpPr>
+          <p:nvPr/>
+        </p:nvCxnSpPr>
+        <p:spPr>
+          <a:xfrm rot="5400000">
+            <a:off x="2128038" y="1177860"/>
+            <a:ext cx="761496" cy="3121147"/>
+          </a:xfrm>
+          <a:prstGeom prst="bentConnector3">
+            <a:avLst>
+              <a:gd name="adj1" fmla="val 50000"/>
+            </a:avLst>
+          </a:prstGeom>
+          <a:ln w="38100">
+            <a:solidFill>
+              <a:schemeClr val="tx1"/>
+            </a:solidFill>
+            <a:tailEnd type="triangle"/>
+          </a:ln>
+        </p:spPr>
+        <p:style>
+          <a:lnRef idx="1">
+            <a:schemeClr val="accent1"/>
+          </a:lnRef>
+          <a:fillRef idx="0">
+            <a:schemeClr val="accent1"/>
+          </a:fillRef>
+          <a:effectRef idx="0">
+            <a:schemeClr val="accent1"/>
+          </a:effectRef>
+          <a:fontRef idx="minor">
+            <a:schemeClr val="tx1"/>
+          </a:fontRef>
+        </p:style>
+      </p:cxnSp>
+      <p:cxnSp>
+        <p:nvCxnSpPr>
+          <p:cNvPr id="30" name="Elbow Connector 29">
+            <a:extLst>
+              <a:ext uri="{FF2B5EF4-FFF2-40B4-BE49-F238E27FC236}">
+                <a16:creationId xmlns:a16="http://schemas.microsoft.com/office/drawing/2014/main" id="{711D594C-0E8E-BB46-A9F1-A895308BB0F5}"/>
+              </a:ext>
+            </a:extLst>
+          </p:cNvPr>
+          <p:cNvCxnSpPr>
+            <a:cxnSpLocks/>
+            <a:stCxn id="12" idx="2"/>
+            <a:endCxn id="17" idx="0"/>
+          </p:cNvCxnSpPr>
+          <p:nvPr/>
+        </p:nvCxnSpPr>
+        <p:spPr>
+          <a:xfrm rot="5400000">
+            <a:off x="3070774" y="2120596"/>
+            <a:ext cx="761496" cy="1235675"/>
+          </a:xfrm>
+          <a:prstGeom prst="bentConnector3">
+            <a:avLst>
+              <a:gd name="adj1" fmla="val 50000"/>
+            </a:avLst>
+          </a:prstGeom>
+          <a:ln w="38100">
+            <a:solidFill>
+              <a:schemeClr val="tx1"/>
+            </a:solidFill>
+            <a:tailEnd type="triangle"/>
+          </a:ln>
+        </p:spPr>
+        <p:style>
+          <a:lnRef idx="1">
+            <a:schemeClr val="accent1"/>
+          </a:lnRef>
+          <a:fillRef idx="0">
+            <a:schemeClr val="accent1"/>
+          </a:fillRef>
+          <a:effectRef idx="0">
+            <a:schemeClr val="accent1"/>
+          </a:effectRef>
+          <a:fontRef idx="minor">
+            <a:schemeClr val="tx1"/>
+          </a:fontRef>
+        </p:style>
+      </p:cxnSp>
+      <p:cxnSp>
+        <p:nvCxnSpPr>
+          <p:cNvPr id="33" name="Elbow Connector 32">
+            <a:extLst>
+              <a:ext uri="{FF2B5EF4-FFF2-40B4-BE49-F238E27FC236}">
+                <a16:creationId xmlns:a16="http://schemas.microsoft.com/office/drawing/2014/main" id="{D5524C6D-742F-D942-A454-7731C5BBD858}"/>
+              </a:ext>
+            </a:extLst>
+          </p:cNvPr>
+          <p:cNvCxnSpPr>
+            <a:cxnSpLocks/>
+            <a:stCxn id="12" idx="2"/>
+            <a:endCxn id="18" idx="0"/>
+          </p:cNvCxnSpPr>
+          <p:nvPr/>
+        </p:nvCxnSpPr>
+        <p:spPr>
+          <a:xfrm rot="16200000" flipH="1">
+            <a:off x="3932157" y="2494886"/>
+            <a:ext cx="761496" cy="487093"/>
+          </a:xfrm>
+          <a:prstGeom prst="bentConnector3">
+            <a:avLst>
+              <a:gd name="adj1" fmla="val 50000"/>
+            </a:avLst>
+          </a:prstGeom>
+          <a:ln w="38100">
+            <a:solidFill>
+              <a:schemeClr val="tx1"/>
+            </a:solidFill>
+            <a:tailEnd type="triangle"/>
+          </a:ln>
+        </p:spPr>
+        <p:style>
+          <a:lnRef idx="1">
+            <a:schemeClr val="accent1"/>
+          </a:lnRef>
+          <a:fillRef idx="0">
+            <a:schemeClr val="accent1"/>
+          </a:fillRef>
+          <a:effectRef idx="0">
+            <a:schemeClr val="accent1"/>
+          </a:effectRef>
+          <a:fontRef idx="minor">
+            <a:schemeClr val="tx1"/>
+          </a:fontRef>
+        </p:style>
+      </p:cxnSp>
+      <p:cxnSp>
+        <p:nvCxnSpPr>
+          <p:cNvPr id="36" name="Elbow Connector 35">
+            <a:extLst>
+              <a:ext uri="{FF2B5EF4-FFF2-40B4-BE49-F238E27FC236}">
+                <a16:creationId xmlns:a16="http://schemas.microsoft.com/office/drawing/2014/main" id="{E57259EC-DCB7-4C48-8929-71B950755099}"/>
+              </a:ext>
+            </a:extLst>
+          </p:cNvPr>
+          <p:cNvCxnSpPr>
+            <a:cxnSpLocks/>
+            <a:stCxn id="12" idx="2"/>
+            <a:endCxn id="21" idx="0"/>
+          </p:cNvCxnSpPr>
+          <p:nvPr/>
+        </p:nvCxnSpPr>
+        <p:spPr>
+          <a:xfrm rot="16200000" flipH="1">
+            <a:off x="4701978" y="1725066"/>
+            <a:ext cx="761496" cy="2026734"/>
+          </a:xfrm>
+          <a:prstGeom prst="bentConnector3">
+            <a:avLst>
+              <a:gd name="adj1" fmla="val 50000"/>
+            </a:avLst>
+          </a:prstGeom>
+          <a:ln w="38100">
+            <a:solidFill>
+              <a:schemeClr val="tx1"/>
+            </a:solidFill>
+            <a:tailEnd type="triangle"/>
+          </a:ln>
+        </p:spPr>
+        <p:style>
+          <a:lnRef idx="1">
+            <a:schemeClr val="accent1"/>
+          </a:lnRef>
+          <a:fillRef idx="0">
+            <a:schemeClr val="accent1"/>
+          </a:fillRef>
+          <a:effectRef idx="0">
+            <a:schemeClr val="accent1"/>
+          </a:effectRef>
+          <a:fontRef idx="minor">
+            <a:schemeClr val="tx1"/>
+          </a:fontRef>
+        </p:style>
+      </p:cxnSp>
+      <p:cxnSp>
+        <p:nvCxnSpPr>
+          <p:cNvPr id="39" name="Elbow Connector 38">
+            <a:extLst>
+              <a:ext uri="{FF2B5EF4-FFF2-40B4-BE49-F238E27FC236}">
+                <a16:creationId xmlns:a16="http://schemas.microsoft.com/office/drawing/2014/main" id="{D2AC21F2-F4D6-444E-A6D6-EC09673E99EA}"/>
+              </a:ext>
+            </a:extLst>
+          </p:cNvPr>
+          <p:cNvCxnSpPr>
+            <a:cxnSpLocks/>
+            <a:stCxn id="12" idx="2"/>
+            <a:endCxn id="20" idx="0"/>
+          </p:cNvCxnSpPr>
+          <p:nvPr/>
+        </p:nvCxnSpPr>
+        <p:spPr>
+          <a:xfrm rot="16200000" flipH="1">
+            <a:off x="5401167" y="1025877"/>
+            <a:ext cx="761496" cy="3425112"/>
+          </a:xfrm>
+          <a:prstGeom prst="bentConnector3">
+            <a:avLst>
+              <a:gd name="adj1" fmla="val 50000"/>
+            </a:avLst>
+          </a:prstGeom>
+          <a:ln w="38100">
+            <a:solidFill>
+              <a:schemeClr val="tx1"/>
+            </a:solidFill>
+            <a:tailEnd type="triangle"/>
+          </a:ln>
+        </p:spPr>
+        <p:style>
+          <a:lnRef idx="1">
+            <a:schemeClr val="accent1"/>
+          </a:lnRef>
+          <a:fillRef idx="0">
+            <a:schemeClr val="accent1"/>
+          </a:fillRef>
+          <a:effectRef idx="0">
+            <a:schemeClr val="accent1"/>
+          </a:effectRef>
+          <a:fontRef idx="minor">
+            <a:schemeClr val="tx1"/>
+          </a:fontRef>
+        </p:style>
+      </p:cxnSp>
+      <p:cxnSp>
+        <p:nvCxnSpPr>
+          <p:cNvPr id="42" name="Elbow Connector 41">
+            <a:extLst>
+              <a:ext uri="{FF2B5EF4-FFF2-40B4-BE49-F238E27FC236}">
+                <a16:creationId xmlns:a16="http://schemas.microsoft.com/office/drawing/2014/main" id="{99EF0B7C-276E-9C45-9F31-3B52E5E37E00}"/>
+              </a:ext>
+            </a:extLst>
+          </p:cNvPr>
+          <p:cNvCxnSpPr>
+            <a:cxnSpLocks/>
+            <a:stCxn id="13" idx="2"/>
+            <a:endCxn id="15" idx="0"/>
+          </p:cNvCxnSpPr>
+          <p:nvPr/>
+        </p:nvCxnSpPr>
+        <p:spPr>
+          <a:xfrm rot="5400000">
+            <a:off x="9339064" y="2233485"/>
+            <a:ext cx="761496" cy="1009896"/>
+          </a:xfrm>
+          <a:prstGeom prst="bentConnector3">
+            <a:avLst>
+              <a:gd name="adj1" fmla="val 50000"/>
+            </a:avLst>
+          </a:prstGeom>
+          <a:ln w="38100">
+            <a:solidFill>
+              <a:schemeClr val="tx1"/>
+            </a:solidFill>
+            <a:tailEnd type="triangle"/>
+          </a:ln>
+        </p:spPr>
+        <p:style>
+          <a:lnRef idx="1">
+            <a:schemeClr val="accent1"/>
+          </a:lnRef>
+          <a:fillRef idx="0">
+            <a:schemeClr val="accent1"/>
+          </a:fillRef>
+          <a:effectRef idx="0">
+            <a:schemeClr val="accent1"/>
+          </a:effectRef>
+          <a:fontRef idx="minor">
+            <a:schemeClr val="tx1"/>
+          </a:fontRef>
+        </p:style>
+      </p:cxnSp>
+      <p:cxnSp>
+        <p:nvCxnSpPr>
+          <p:cNvPr id="45" name="Elbow Connector 44">
+            <a:extLst>
+              <a:ext uri="{FF2B5EF4-FFF2-40B4-BE49-F238E27FC236}">
+                <a16:creationId xmlns:a16="http://schemas.microsoft.com/office/drawing/2014/main" id="{8BCD1260-FE54-F24B-9487-2A08B4FB0457}"/>
+              </a:ext>
+            </a:extLst>
+          </p:cNvPr>
+          <p:cNvCxnSpPr>
+            <a:cxnSpLocks/>
+            <a:stCxn id="13" idx="2"/>
+            <a:endCxn id="14" idx="0"/>
+          </p:cNvCxnSpPr>
+          <p:nvPr/>
+        </p:nvCxnSpPr>
+        <p:spPr>
+          <a:xfrm rot="16200000" flipH="1">
+            <a:off x="10350101" y="2232343"/>
+            <a:ext cx="761496" cy="1012179"/>
+          </a:xfrm>
+          <a:prstGeom prst="bentConnector3">
+            <a:avLst>
+              <a:gd name="adj1" fmla="val 50000"/>
+            </a:avLst>
+          </a:prstGeom>
+          <a:ln w="38100">
+            <a:solidFill>
+              <a:schemeClr val="tx1"/>
+            </a:solidFill>
+            <a:tailEnd type="triangle"/>
+          </a:ln>
+        </p:spPr>
+        <p:style>
+          <a:lnRef idx="1">
+            <a:schemeClr val="accent1"/>
+          </a:lnRef>
+          <a:fillRef idx="0">
+            <a:schemeClr val="accent1"/>
+          </a:fillRef>
+          <a:effectRef idx="0">
+            <a:schemeClr val="accent1"/>
+          </a:effectRef>
+          <a:fontRef idx="minor">
+            <a:schemeClr val="tx1"/>
+          </a:fontRef>
+        </p:style>
+      </p:cxnSp>
+      <p:sp>
+        <p:nvSpPr>
+          <p:cNvPr id="52" name="TextBox 51">
+            <a:extLst>
+              <a:ext uri="{FF2B5EF4-FFF2-40B4-BE49-F238E27FC236}">
+                <a16:creationId xmlns:a16="http://schemas.microsoft.com/office/drawing/2014/main" id="{19B07F61-7B5C-F84D-B91A-2D226ACAAD30}"/>
+              </a:ext>
+            </a:extLst>
+          </p:cNvPr>
+          <p:cNvSpPr txBox="1"/>
+          <p:nvPr/>
+        </p:nvSpPr>
+        <p:spPr>
+          <a:xfrm>
+            <a:off x="160422" y="5261812"/>
+            <a:ext cx="1475874" cy="923330"/>
+          </a:xfrm>
+          <a:prstGeom prst="rect">
+            <a:avLst/>
+          </a:prstGeom>
+          <a:noFill/>
+        </p:spPr>
+        <p:txBody>
+          <a:bodyPr wrap="square" rtlCol="0">
+            <a:spAutoFit/>
+          </a:bodyPr>
+          <a:lstStyle/>
+          <a:p>
+            <a:pPr algn="ctr"/>
+            <a:r>
+              <a:rPr lang="en-US" dirty="0">
+                <a:latin typeface="Avenir Book" panose="02000503020000020003" pitchFamily="2" charset="0"/>
+              </a:rPr>
+              <a:t>Typically less convincing</a:t>
+            </a:r>
+          </a:p>
+        </p:txBody>
+      </p:sp>
+      <p:sp>
+        <p:nvSpPr>
+          <p:cNvPr id="53" name="TextBox 52">
+            <a:extLst>
+              <a:ext uri="{FF2B5EF4-FFF2-40B4-BE49-F238E27FC236}">
+                <a16:creationId xmlns:a16="http://schemas.microsoft.com/office/drawing/2014/main" id="{BD89862C-4804-7F40-90DD-8D6197B3CD5C}"/>
+              </a:ext>
+            </a:extLst>
+          </p:cNvPr>
+          <p:cNvSpPr txBox="1"/>
+          <p:nvPr/>
+        </p:nvSpPr>
+        <p:spPr>
+          <a:xfrm>
+            <a:off x="10316648" y="5400311"/>
+            <a:ext cx="1643914" cy="646331"/>
+          </a:xfrm>
+          <a:prstGeom prst="rect">
+            <a:avLst/>
+          </a:prstGeom>
+          <a:noFill/>
+        </p:spPr>
+        <p:txBody>
+          <a:bodyPr wrap="square" rtlCol="0">
+            <a:spAutoFit/>
+          </a:bodyPr>
+          <a:lstStyle/>
+          <a:p>
+            <a:pPr algn="ctr"/>
+            <a:r>
+              <a:rPr lang="en-US" dirty="0">
+                <a:latin typeface="Avenir Book" panose="02000503020000020003" pitchFamily="2" charset="0"/>
+              </a:rPr>
+              <a:t>Typically more convincing</a:t>
+            </a:r>
+          </a:p>
+        </p:txBody>
+      </p:sp>
+      <p:cxnSp>
+        <p:nvCxnSpPr>
+          <p:cNvPr id="55" name="Straight Arrow Connector 54">
+            <a:extLst>
+              <a:ext uri="{FF2B5EF4-FFF2-40B4-BE49-F238E27FC236}">
+                <a16:creationId xmlns:a16="http://schemas.microsoft.com/office/drawing/2014/main" id="{A76F4747-8C2C-2940-B7AD-4733506A39B5}"/>
+              </a:ext>
+            </a:extLst>
+          </p:cNvPr>
+          <p:cNvCxnSpPr>
+            <a:cxnSpLocks/>
+            <a:stCxn id="52" idx="3"/>
+            <a:endCxn id="53" idx="1"/>
+          </p:cNvCxnSpPr>
+          <p:nvPr/>
+        </p:nvCxnSpPr>
+        <p:spPr>
+          <a:xfrm>
+            <a:off x="1636296" y="5723477"/>
+            <a:ext cx="8680352" cy="0"/>
+          </a:xfrm>
+          <a:prstGeom prst="straightConnector1">
+            <a:avLst/>
+          </a:prstGeom>
+          <a:ln w="76200">
+            <a:solidFill>
+              <a:schemeClr val="tx1"/>
+            </a:solidFill>
+            <a:tailEnd type="triangle"/>
+          </a:ln>
+        </p:spPr>
+        <p:style>
+          <a:lnRef idx="1">
+            <a:schemeClr val="accent1"/>
+          </a:lnRef>
+          <a:fillRef idx="0">
+            <a:schemeClr val="accent1"/>
+          </a:fillRef>
+          <a:effectRef idx="0">
+            <a:schemeClr val="accent1"/>
+          </a:effectRef>
+          <a:fontRef idx="minor">
+            <a:schemeClr val="tx1"/>
+          </a:fontRef>
+        </p:style>
+      </p:cxnSp>
+    </p:spTree>
+    <p:extLst>
+      <p:ext uri="{BB962C8B-B14F-4D97-AF65-F5344CB8AC3E}">
+        <p14:creationId xmlns:p14="http://schemas.microsoft.com/office/powerpoint/2010/main" val="3893655959"/>
+      </p:ext>
+    </p:extLst>
+  </p:cSld>
+  <p:clrMapOvr>
+    <a:masterClrMapping/>
+  </p:clrMapOvr>
 </p:sld>
 </file>
 
@@ -30566,6 +31712,15 @@
 </file>
 
 <file path=customXml/item1.xml><?xml version="1.0" encoding="utf-8"?>
+<?mso-contentType ?>
+<FormTemplates xmlns="http://schemas.microsoft.com/sharepoint/v3/contenttype/forms">
+  <Display>DocumentLibraryForm</Display>
+  <Edit>DocumentLibraryForm</Edit>
+  <New>DocumentLibraryForm</New>
+</FormTemplates>
+</file>
+
+<file path=customXml/item2.xml><?xml version="1.0" encoding="utf-8"?>
 <p:properties xmlns:p="http://schemas.microsoft.com/office/2006/metadata/properties" xmlns:xsi="http://www.w3.org/2001/XMLSchema-instance" xmlns:pc="http://schemas.microsoft.com/office/infopath/2007/PartnerControls">
   <documentManagement>
     <lcf76f155ced4ddcb4097134ff3c332f xmlns="e3793ca1-6164-4dfb-aaf8-0aa60c0c70c2">
@@ -30582,15 +31737,6 @@
     </SharedWithUsers>
   </documentManagement>
 </p:properties>
-</file>
-
-<file path=customXml/item2.xml><?xml version="1.0" encoding="utf-8"?>
-<?mso-contentType ?>
-<FormTemplates xmlns="http://schemas.microsoft.com/sharepoint/v3/contenttype/forms">
-  <Display>DocumentLibraryForm</Display>
-  <Edit>DocumentLibraryForm</Edit>
-  <New>DocumentLibraryForm</New>
-</FormTemplates>
 </file>
 
 <file path=customXml/item3.xml><?xml version="1.0" encoding="utf-8"?>
@@ -30817,6 +31963,14 @@
 </file>
 
 <file path=customXml/itemProps1.xml><?xml version="1.0" encoding="utf-8"?>
+<ds:datastoreItem xmlns:ds="http://schemas.openxmlformats.org/officeDocument/2006/customXml" ds:itemID="{DEA96062-FB9F-4051-B89A-2E1540EFD6E3}">
+  <ds:schemaRefs>
+    <ds:schemaRef ds:uri="http://schemas.microsoft.com/sharepoint/v3/contenttype/forms"/>
+  </ds:schemaRefs>
+</ds:datastoreItem>
+</file>
+
+<file path=customXml/itemProps2.xml><?xml version="1.0" encoding="utf-8"?>
 <ds:datastoreItem xmlns:ds="http://schemas.openxmlformats.org/officeDocument/2006/customXml" ds:itemID="{D8F1320E-D9A1-4589-BDE1-F2D1289F6814}">
   <ds:schemaRefs>
     <ds:schemaRef ds:uri="http://schemas.microsoft.com/office/2006/documentManagement/types"/>
@@ -30829,14 +31983,6 @@
     <ds:schemaRef ds:uri="http://schemas.microsoft.com/office/infopath/2007/PartnerControls"/>
     <ds:schemaRef ds:uri="http://schemas.openxmlformats.org/package/2006/metadata/core-properties"/>
     <ds:schemaRef ds:uri="http://purl.org/dc/terms/"/>
-  </ds:schemaRefs>
-</ds:datastoreItem>
-</file>
-
-<file path=customXml/itemProps2.xml><?xml version="1.0" encoding="utf-8"?>
-<ds:datastoreItem xmlns:ds="http://schemas.openxmlformats.org/officeDocument/2006/customXml" ds:itemID="{DEA96062-FB9F-4051-B89A-2E1540EFD6E3}">
-  <ds:schemaRefs>
-    <ds:schemaRef ds:uri="http://schemas.microsoft.com/sharepoint/v3/contenttype/forms"/>
   </ds:schemaRefs>
 </ds:datastoreItem>
 </file>

</xml_diff>